<commit_message>
Replace C# Connect4 Server with JS Hangman server
</commit_message>
<xml_diff>
--- a/CodeDojoIntroMaterials/Hangman.pptx
+++ b/CodeDojoIntroMaterials/Hangman.pptx
@@ -210,7 +210,7 @@
           <a:p>
             <a:fld id="{FF6F425D-DEA3-43AE-8BD4-73C15BA73D62}" type="datetimeFigureOut">
               <a:rPr lang="en-GB" smtClean="0"/>
-              <a:t>24/03/2018</a:t>
+              <a:t>07/04/2018</a:t>
             </a:fld>
             <a:endParaRPr lang="en-GB"/>
           </a:p>
@@ -1211,7 +1211,7 @@
           <a:p>
             <a:fld id="{8C2DC95F-4758-45CC-8E65-674D23536E7F}" type="datetimeFigureOut">
               <a:rPr lang="en-GB" smtClean="0"/>
-              <a:t>24/03/2018</a:t>
+              <a:t>07/04/2018</a:t>
             </a:fld>
             <a:endParaRPr lang="en-GB"/>
           </a:p>
@@ -1421,7 +1421,7 @@
           <a:p>
             <a:fld id="{8C2DC95F-4758-45CC-8E65-674D23536E7F}" type="datetimeFigureOut">
               <a:rPr lang="en-GB" smtClean="0"/>
-              <a:t>24/03/2018</a:t>
+              <a:t>07/04/2018</a:t>
             </a:fld>
             <a:endParaRPr lang="en-GB"/>
           </a:p>
@@ -1631,7 +1631,7 @@
           <a:p>
             <a:fld id="{8C2DC95F-4758-45CC-8E65-674D23536E7F}" type="datetimeFigureOut">
               <a:rPr lang="en-GB" smtClean="0"/>
-              <a:t>24/03/2018</a:t>
+              <a:t>07/04/2018</a:t>
             </a:fld>
             <a:endParaRPr lang="en-GB"/>
           </a:p>
@@ -1907,7 +1907,7 @@
           <a:p>
             <a:fld id="{8C2DC95F-4758-45CC-8E65-674D23536E7F}" type="datetimeFigureOut">
               <a:rPr lang="en-GB" smtClean="0"/>
-              <a:t>24/03/2018</a:t>
+              <a:t>07/04/2018</a:t>
             </a:fld>
             <a:endParaRPr lang="en-GB"/>
           </a:p>
@@ -2177,7 +2177,7 @@
           <a:p>
             <a:fld id="{8C2DC95F-4758-45CC-8E65-674D23536E7F}" type="datetimeFigureOut">
               <a:rPr lang="en-GB" smtClean="0"/>
-              <a:t>24/03/2018</a:t>
+              <a:t>07/04/2018</a:t>
             </a:fld>
             <a:endParaRPr lang="en-GB"/>
           </a:p>
@@ -2583,7 +2583,7 @@
           <a:p>
             <a:fld id="{8C2DC95F-4758-45CC-8E65-674D23536E7F}" type="datetimeFigureOut">
               <a:rPr lang="en-GB" smtClean="0"/>
-              <a:t>24/03/2018</a:t>
+              <a:t>07/04/2018</a:t>
             </a:fld>
             <a:endParaRPr lang="en-GB"/>
           </a:p>
@@ -2733,7 +2733,7 @@
           <a:p>
             <a:fld id="{8C2DC95F-4758-45CC-8E65-674D23536E7F}" type="datetimeFigureOut">
               <a:rPr lang="en-GB" smtClean="0"/>
-              <a:t>24/03/2018</a:t>
+              <a:t>07/04/2018</a:t>
             </a:fld>
             <a:endParaRPr lang="en-GB"/>
           </a:p>
@@ -2852,7 +2852,7 @@
           <a:p>
             <a:fld id="{8C2DC95F-4758-45CC-8E65-674D23536E7F}" type="datetimeFigureOut">
               <a:rPr lang="en-GB" smtClean="0"/>
-              <a:t>24/03/2018</a:t>
+              <a:t>07/04/2018</a:t>
             </a:fld>
             <a:endParaRPr lang="en-GB"/>
           </a:p>
@@ -3162,7 +3162,7 @@
           <a:p>
             <a:fld id="{8C2DC95F-4758-45CC-8E65-674D23536E7F}" type="datetimeFigureOut">
               <a:rPr lang="en-GB" smtClean="0"/>
-              <a:t>24/03/2018</a:t>
+              <a:t>07/04/2018</a:t>
             </a:fld>
             <a:endParaRPr lang="en-GB"/>
           </a:p>
@@ -3452,7 +3452,7 @@
           <a:p>
             <a:fld id="{8C2DC95F-4758-45CC-8E65-674D23536E7F}" type="datetimeFigureOut">
               <a:rPr lang="en-GB" smtClean="0"/>
-              <a:t>24/03/2018</a:t>
+              <a:t>07/04/2018</a:t>
             </a:fld>
             <a:endParaRPr lang="en-GB"/>
           </a:p>
@@ -3976,12 +3976,221 @@
           </a:p>
         </p:txBody>
       </p:sp>
+      <p:cxnSp>
+        <p:nvCxnSpPr>
+          <p:cNvPr id="8" name="Straight Connector 7">
+            <a:extLst>
+              <a:ext uri="{FF2B5EF4-FFF2-40B4-BE49-F238E27FC236}">
+                <a16:creationId xmlns:a16="http://schemas.microsoft.com/office/drawing/2014/main" id="{CB3227AF-4646-D049-8F53-C7CE4698D990}"/>
+              </a:ext>
+            </a:extLst>
+          </p:cNvPr>
+          <p:cNvCxnSpPr>
+            <a:cxnSpLocks/>
+          </p:cNvCxnSpPr>
+          <p:nvPr/>
+        </p:nvCxnSpPr>
+        <p:spPr>
+          <a:xfrm>
+            <a:off x="8868323" y="1683866"/>
+            <a:ext cx="0" cy="3945573"/>
+          </a:xfrm>
+          <a:prstGeom prst="line">
+            <a:avLst/>
+          </a:prstGeom>
+          <a:ln w="76200"/>
+        </p:spPr>
+        <p:style>
+          <a:lnRef idx="1">
+            <a:schemeClr val="accent1"/>
+          </a:lnRef>
+          <a:fillRef idx="0">
+            <a:schemeClr val="accent1"/>
+          </a:fillRef>
+          <a:effectRef idx="0">
+            <a:schemeClr val="accent1"/>
+          </a:effectRef>
+          <a:fontRef idx="minor">
+            <a:schemeClr val="tx1"/>
+          </a:fontRef>
+        </p:style>
+      </p:cxnSp>
+      <p:cxnSp>
+        <p:nvCxnSpPr>
+          <p:cNvPr id="9" name="Straight Connector 8">
+            <a:extLst>
+              <a:ext uri="{FF2B5EF4-FFF2-40B4-BE49-F238E27FC236}">
+                <a16:creationId xmlns:a16="http://schemas.microsoft.com/office/drawing/2014/main" id="{05457A01-BC25-D44E-8D08-5B35300B4C6F}"/>
+              </a:ext>
+            </a:extLst>
+          </p:cNvPr>
+          <p:cNvCxnSpPr>
+            <a:cxnSpLocks/>
+          </p:cNvCxnSpPr>
+          <p:nvPr/>
+        </p:nvCxnSpPr>
+        <p:spPr>
+          <a:xfrm flipH="1">
+            <a:off x="8852050" y="1708579"/>
+            <a:ext cx="1787117" cy="0"/>
+          </a:xfrm>
+          <a:prstGeom prst="line">
+            <a:avLst/>
+          </a:prstGeom>
+          <a:ln w="76200"/>
+        </p:spPr>
+        <p:style>
+          <a:lnRef idx="1">
+            <a:schemeClr val="accent1"/>
+          </a:lnRef>
+          <a:fillRef idx="0">
+            <a:schemeClr val="accent1"/>
+          </a:fillRef>
+          <a:effectRef idx="0">
+            <a:schemeClr val="accent1"/>
+          </a:effectRef>
+          <a:fontRef idx="minor">
+            <a:schemeClr val="tx1"/>
+          </a:fontRef>
+        </p:style>
+      </p:cxnSp>
+      <p:cxnSp>
+        <p:nvCxnSpPr>
+          <p:cNvPr id="11" name="Straight Connector 10">
+            <a:extLst>
+              <a:ext uri="{FF2B5EF4-FFF2-40B4-BE49-F238E27FC236}">
+                <a16:creationId xmlns:a16="http://schemas.microsoft.com/office/drawing/2014/main" id="{79312C7D-78CA-0B47-A2A6-3D69ADB9A56E}"/>
+              </a:ext>
+            </a:extLst>
+          </p:cNvPr>
+          <p:cNvCxnSpPr>
+            <a:cxnSpLocks/>
+          </p:cNvCxnSpPr>
+          <p:nvPr/>
+        </p:nvCxnSpPr>
+        <p:spPr>
+          <a:xfrm flipH="1" flipV="1">
+            <a:off x="10612383" y="1683866"/>
+            <a:ext cx="2" cy="806698"/>
+          </a:xfrm>
+          <a:prstGeom prst="line">
+            <a:avLst/>
+          </a:prstGeom>
+          <a:ln w="76200"/>
+        </p:spPr>
+        <p:style>
+          <a:lnRef idx="1">
+            <a:schemeClr val="accent1"/>
+          </a:lnRef>
+          <a:fillRef idx="0">
+            <a:schemeClr val="accent1"/>
+          </a:fillRef>
+          <a:effectRef idx="0">
+            <a:schemeClr val="accent1"/>
+          </a:effectRef>
+          <a:fontRef idx="minor">
+            <a:schemeClr val="tx1"/>
+          </a:fontRef>
+        </p:style>
+      </p:cxnSp>
+      <p:sp>
+        <p:nvSpPr>
+          <p:cNvPr id="13" name="Oval 12">
+            <a:extLst>
+              <a:ext uri="{FF2B5EF4-FFF2-40B4-BE49-F238E27FC236}">
+                <a16:creationId xmlns:a16="http://schemas.microsoft.com/office/drawing/2014/main" id="{53EE138F-9DFC-134B-8202-3557934DBBC8}"/>
+              </a:ext>
+            </a:extLst>
+          </p:cNvPr>
+          <p:cNvSpPr/>
+          <p:nvPr/>
+        </p:nvSpPr>
+        <p:spPr>
+          <a:xfrm>
+            <a:off x="10324937" y="2515754"/>
+            <a:ext cx="574889" cy="586643"/>
+          </a:xfrm>
+          <a:prstGeom prst="ellipse">
+            <a:avLst/>
+          </a:prstGeom>
+          <a:ln w="57150">
+            <a:solidFill>
+              <a:schemeClr val="accent6"/>
+            </a:solidFill>
+          </a:ln>
+        </p:spPr>
+        <p:style>
+          <a:lnRef idx="2">
+            <a:schemeClr val="accent6"/>
+          </a:lnRef>
+          <a:fillRef idx="1">
+            <a:schemeClr val="lt1"/>
+          </a:fillRef>
+          <a:effectRef idx="0">
+            <a:schemeClr val="accent6"/>
+          </a:effectRef>
+          <a:fontRef idx="minor">
+            <a:schemeClr val="dk1"/>
+          </a:fontRef>
+        </p:style>
+        <p:txBody>
+          <a:bodyPr rtlCol="0" anchor="ctr"/>
+          <a:lstStyle/>
+          <a:p>
+            <a:pPr algn="ctr"/>
+            <a:endParaRPr lang="en-US"/>
+          </a:p>
+        </p:txBody>
+      </p:sp>
+      <p:cxnSp>
+        <p:nvCxnSpPr>
+          <p:cNvPr id="15" name="Straight Connector 14">
+            <a:extLst>
+              <a:ext uri="{FF2B5EF4-FFF2-40B4-BE49-F238E27FC236}">
+                <a16:creationId xmlns:a16="http://schemas.microsoft.com/office/drawing/2014/main" id="{15A89763-320C-7B46-9961-8C444F7A3AD6}"/>
+              </a:ext>
+            </a:extLst>
+          </p:cNvPr>
+          <p:cNvCxnSpPr>
+            <a:cxnSpLocks/>
+          </p:cNvCxnSpPr>
+          <p:nvPr/>
+        </p:nvCxnSpPr>
+        <p:spPr>
+          <a:xfrm>
+            <a:off x="10612381" y="3127587"/>
+            <a:ext cx="0" cy="931795"/>
+          </a:xfrm>
+          <a:prstGeom prst="line">
+            <a:avLst/>
+          </a:prstGeom>
+          <a:ln w="57150">
+            <a:solidFill>
+              <a:schemeClr val="accent6"/>
+            </a:solidFill>
+          </a:ln>
+        </p:spPr>
+        <p:style>
+          <a:lnRef idx="1">
+            <a:schemeClr val="accent1"/>
+          </a:lnRef>
+          <a:fillRef idx="0">
+            <a:schemeClr val="accent1"/>
+          </a:fillRef>
+          <a:effectRef idx="0">
+            <a:schemeClr val="accent1"/>
+          </a:effectRef>
+          <a:fontRef idx="minor">
+            <a:schemeClr val="tx1"/>
+          </a:fontRef>
+        </p:style>
+      </p:cxnSp>
       <p:grpSp>
         <p:nvGrpSpPr>
-          <p:cNvPr id="61" name="Group 60">
+          <p:cNvPr id="27" name="Group 26">
             <a:extLst>
               <a:ext uri="{FF2B5EF4-FFF2-40B4-BE49-F238E27FC236}">
-                <a16:creationId xmlns:a16="http://schemas.microsoft.com/office/drawing/2014/main" id="{6301A43E-AE9B-654E-A5F9-C72D3402F782}"/>
+                <a16:creationId xmlns:a16="http://schemas.microsoft.com/office/drawing/2014/main" id="{F4D1E0FC-C748-C64D-A059-72BE17C407EA}"/>
               </a:ext>
             </a:extLst>
           </p:cNvPr>
@@ -3990,221 +4199,12 @@
         </p:nvGrpSpPr>
         <p:grpSpPr>
           <a:xfrm>
-            <a:off x="8365524" y="1683866"/>
-            <a:ext cx="2759677" cy="3945573"/>
-            <a:chOff x="8365524" y="1683866"/>
-            <a:chExt cx="2759677" cy="3945573"/>
+            <a:off x="10175301" y="3297738"/>
+            <a:ext cx="874159" cy="1577314"/>
+            <a:chOff x="10099568" y="3625104"/>
+            <a:chExt cx="1025633" cy="1577314"/>
           </a:xfrm>
         </p:grpSpPr>
-        <p:cxnSp>
-          <p:nvCxnSpPr>
-            <p:cNvPr id="8" name="Straight Connector 7">
-              <a:extLst>
-                <a:ext uri="{FF2B5EF4-FFF2-40B4-BE49-F238E27FC236}">
-                  <a16:creationId xmlns:a16="http://schemas.microsoft.com/office/drawing/2014/main" id="{CB3227AF-4646-D049-8F53-C7CE4698D990}"/>
-                </a:ext>
-              </a:extLst>
-            </p:cNvPr>
-            <p:cNvCxnSpPr>
-              <a:cxnSpLocks/>
-            </p:cNvCxnSpPr>
-            <p:nvPr/>
-          </p:nvCxnSpPr>
-          <p:spPr>
-            <a:xfrm>
-              <a:off x="8868323" y="1683866"/>
-              <a:ext cx="0" cy="3945573"/>
-            </a:xfrm>
-            <a:prstGeom prst="line">
-              <a:avLst/>
-            </a:prstGeom>
-            <a:ln w="76200"/>
-          </p:spPr>
-          <p:style>
-            <a:lnRef idx="1">
-              <a:schemeClr val="accent1"/>
-            </a:lnRef>
-            <a:fillRef idx="0">
-              <a:schemeClr val="accent1"/>
-            </a:fillRef>
-            <a:effectRef idx="0">
-              <a:schemeClr val="accent1"/>
-            </a:effectRef>
-            <a:fontRef idx="minor">
-              <a:schemeClr val="tx1"/>
-            </a:fontRef>
-          </p:style>
-        </p:cxnSp>
-        <p:cxnSp>
-          <p:nvCxnSpPr>
-            <p:cNvPr id="9" name="Straight Connector 8">
-              <a:extLst>
-                <a:ext uri="{FF2B5EF4-FFF2-40B4-BE49-F238E27FC236}">
-                  <a16:creationId xmlns:a16="http://schemas.microsoft.com/office/drawing/2014/main" id="{05457A01-BC25-D44E-8D08-5B35300B4C6F}"/>
-                </a:ext>
-              </a:extLst>
-            </p:cNvPr>
-            <p:cNvCxnSpPr>
-              <a:cxnSpLocks/>
-            </p:cNvCxnSpPr>
-            <p:nvPr/>
-          </p:nvCxnSpPr>
-          <p:spPr>
-            <a:xfrm flipH="1">
-              <a:off x="8852050" y="1708579"/>
-              <a:ext cx="1787117" cy="0"/>
-            </a:xfrm>
-            <a:prstGeom prst="line">
-              <a:avLst/>
-            </a:prstGeom>
-            <a:ln w="76200"/>
-          </p:spPr>
-          <p:style>
-            <a:lnRef idx="1">
-              <a:schemeClr val="accent1"/>
-            </a:lnRef>
-            <a:fillRef idx="0">
-              <a:schemeClr val="accent1"/>
-            </a:fillRef>
-            <a:effectRef idx="0">
-              <a:schemeClr val="accent1"/>
-            </a:effectRef>
-            <a:fontRef idx="minor">
-              <a:schemeClr val="tx1"/>
-            </a:fontRef>
-          </p:style>
-        </p:cxnSp>
-        <p:cxnSp>
-          <p:nvCxnSpPr>
-            <p:cNvPr id="11" name="Straight Connector 10">
-              <a:extLst>
-                <a:ext uri="{FF2B5EF4-FFF2-40B4-BE49-F238E27FC236}">
-                  <a16:creationId xmlns:a16="http://schemas.microsoft.com/office/drawing/2014/main" id="{79312C7D-78CA-0B47-A2A6-3D69ADB9A56E}"/>
-                </a:ext>
-              </a:extLst>
-            </p:cNvPr>
-            <p:cNvCxnSpPr>
-              <a:cxnSpLocks/>
-            </p:cNvCxnSpPr>
-            <p:nvPr/>
-          </p:nvCxnSpPr>
-          <p:spPr>
-            <a:xfrm flipH="1" flipV="1">
-              <a:off x="10612383" y="1683866"/>
-              <a:ext cx="2" cy="806698"/>
-            </a:xfrm>
-            <a:prstGeom prst="line">
-              <a:avLst/>
-            </a:prstGeom>
-            <a:ln w="76200"/>
-          </p:spPr>
-          <p:style>
-            <a:lnRef idx="1">
-              <a:schemeClr val="accent1"/>
-            </a:lnRef>
-            <a:fillRef idx="0">
-              <a:schemeClr val="accent1"/>
-            </a:fillRef>
-            <a:effectRef idx="0">
-              <a:schemeClr val="accent1"/>
-            </a:effectRef>
-            <a:fontRef idx="minor">
-              <a:schemeClr val="tx1"/>
-            </a:fontRef>
-          </p:style>
-        </p:cxnSp>
-        <p:sp>
-          <p:nvSpPr>
-            <p:cNvPr id="13" name="Oval 12">
-              <a:extLst>
-                <a:ext uri="{FF2B5EF4-FFF2-40B4-BE49-F238E27FC236}">
-                  <a16:creationId xmlns:a16="http://schemas.microsoft.com/office/drawing/2014/main" id="{53EE138F-9DFC-134B-8202-3557934DBBC8}"/>
-                </a:ext>
-              </a:extLst>
-            </p:cNvPr>
-            <p:cNvSpPr/>
-            <p:nvPr/>
-          </p:nvSpPr>
-          <p:spPr>
-            <a:xfrm>
-              <a:off x="10231656" y="2502921"/>
-              <a:ext cx="761457" cy="766648"/>
-            </a:xfrm>
-            <a:prstGeom prst="ellipse">
-              <a:avLst/>
-            </a:prstGeom>
-            <a:ln w="57150">
-              <a:solidFill>
-                <a:schemeClr val="accent6"/>
-              </a:solidFill>
-            </a:ln>
-          </p:spPr>
-          <p:style>
-            <a:lnRef idx="2">
-              <a:schemeClr val="accent6"/>
-            </a:lnRef>
-            <a:fillRef idx="1">
-              <a:schemeClr val="lt1"/>
-            </a:fillRef>
-            <a:effectRef idx="0">
-              <a:schemeClr val="accent6"/>
-            </a:effectRef>
-            <a:fontRef idx="minor">
-              <a:schemeClr val="dk1"/>
-            </a:fontRef>
-          </p:style>
-          <p:txBody>
-            <a:bodyPr rtlCol="0" anchor="ctr"/>
-            <a:lstStyle/>
-            <a:p>
-              <a:pPr algn="ctr"/>
-              <a:endParaRPr lang="en-US"/>
-            </a:p>
-          </p:txBody>
-        </p:sp>
-        <p:cxnSp>
-          <p:nvCxnSpPr>
-            <p:cNvPr id="15" name="Straight Connector 14">
-              <a:extLst>
-                <a:ext uri="{FF2B5EF4-FFF2-40B4-BE49-F238E27FC236}">
-                  <a16:creationId xmlns:a16="http://schemas.microsoft.com/office/drawing/2014/main" id="{15A89763-320C-7B46-9961-8C444F7A3AD6}"/>
-                </a:ext>
-              </a:extLst>
-            </p:cNvPr>
-            <p:cNvCxnSpPr>
-              <a:cxnSpLocks/>
-            </p:cNvCxnSpPr>
-            <p:nvPr/>
-          </p:nvCxnSpPr>
-          <p:spPr>
-            <a:xfrm>
-              <a:off x="10612385" y="3286609"/>
-              <a:ext cx="0" cy="1110827"/>
-            </a:xfrm>
-            <a:prstGeom prst="line">
-              <a:avLst/>
-            </a:prstGeom>
-            <a:ln w="57150">
-              <a:solidFill>
-                <a:schemeClr val="accent6"/>
-              </a:solidFill>
-            </a:ln>
-          </p:spPr>
-          <p:style>
-            <a:lnRef idx="1">
-              <a:schemeClr val="accent1"/>
-            </a:lnRef>
-            <a:fillRef idx="0">
-              <a:schemeClr val="accent1"/>
-            </a:fillRef>
-            <a:effectRef idx="0">
-              <a:schemeClr val="accent1"/>
-            </a:effectRef>
-            <a:fontRef idx="minor">
-              <a:schemeClr val="tx1"/>
-            </a:fontRef>
-          </p:style>
-        </p:cxnSp>
         <p:cxnSp>
           <p:nvCxnSpPr>
             <p:cNvPr id="16" name="Straight Connector 15">
@@ -4377,85 +4377,85 @@
             </a:fontRef>
           </p:style>
         </p:cxnSp>
-        <p:cxnSp>
-          <p:nvCxnSpPr>
-            <p:cNvPr id="33" name="Straight Connector 32">
-              <a:extLst>
-                <a:ext uri="{FF2B5EF4-FFF2-40B4-BE49-F238E27FC236}">
-                  <a16:creationId xmlns:a16="http://schemas.microsoft.com/office/drawing/2014/main" id="{544BDAF0-C483-D540-AF1F-970DDA76E352}"/>
-                </a:ext>
-              </a:extLst>
-            </p:cNvPr>
-            <p:cNvCxnSpPr>
-              <a:cxnSpLocks/>
-            </p:cNvCxnSpPr>
-            <p:nvPr/>
-          </p:nvCxnSpPr>
-          <p:spPr>
-            <a:xfrm flipH="1">
-              <a:off x="8365524" y="5629439"/>
-              <a:ext cx="973052" cy="0"/>
-            </a:xfrm>
-            <a:prstGeom prst="line">
-              <a:avLst/>
-            </a:prstGeom>
-            <a:ln w="76200"/>
-          </p:spPr>
-          <p:style>
-            <a:lnRef idx="1">
-              <a:schemeClr val="accent1"/>
-            </a:lnRef>
-            <a:fillRef idx="0">
-              <a:schemeClr val="accent1"/>
-            </a:fillRef>
-            <a:effectRef idx="0">
-              <a:schemeClr val="accent1"/>
-            </a:effectRef>
-            <a:fontRef idx="minor">
-              <a:schemeClr val="tx1"/>
-            </a:fontRef>
-          </p:style>
-        </p:cxnSp>
-        <p:cxnSp>
-          <p:nvCxnSpPr>
-            <p:cNvPr id="56" name="Straight Connector 55">
-              <a:extLst>
-                <a:ext uri="{FF2B5EF4-FFF2-40B4-BE49-F238E27FC236}">
-                  <a16:creationId xmlns:a16="http://schemas.microsoft.com/office/drawing/2014/main" id="{8A7F86A3-55C8-4848-AF9A-5C1467D8F9C1}"/>
-                </a:ext>
-              </a:extLst>
-            </p:cNvPr>
-            <p:cNvCxnSpPr>
-              <a:cxnSpLocks/>
-            </p:cNvCxnSpPr>
-            <p:nvPr/>
-          </p:nvCxnSpPr>
-          <p:spPr>
-            <a:xfrm flipH="1">
-              <a:off x="8868323" y="1703689"/>
-              <a:ext cx="543639" cy="564760"/>
-            </a:xfrm>
-            <a:prstGeom prst="line">
-              <a:avLst/>
-            </a:prstGeom>
-            <a:ln w="76200"/>
-          </p:spPr>
-          <p:style>
-            <a:lnRef idx="1">
-              <a:schemeClr val="accent1"/>
-            </a:lnRef>
-            <a:fillRef idx="0">
-              <a:schemeClr val="accent1"/>
-            </a:fillRef>
-            <a:effectRef idx="0">
-              <a:schemeClr val="accent1"/>
-            </a:effectRef>
-            <a:fontRef idx="minor">
-              <a:schemeClr val="tx1"/>
-            </a:fontRef>
-          </p:style>
-        </p:cxnSp>
       </p:grpSp>
+      <p:cxnSp>
+        <p:nvCxnSpPr>
+          <p:cNvPr id="33" name="Straight Connector 32">
+            <a:extLst>
+              <a:ext uri="{FF2B5EF4-FFF2-40B4-BE49-F238E27FC236}">
+                <a16:creationId xmlns:a16="http://schemas.microsoft.com/office/drawing/2014/main" id="{544BDAF0-C483-D540-AF1F-970DDA76E352}"/>
+              </a:ext>
+            </a:extLst>
+          </p:cNvPr>
+          <p:cNvCxnSpPr>
+            <a:cxnSpLocks/>
+          </p:cNvCxnSpPr>
+          <p:nvPr/>
+        </p:nvCxnSpPr>
+        <p:spPr>
+          <a:xfrm flipH="1">
+            <a:off x="8365524" y="5629439"/>
+            <a:ext cx="973052" cy="0"/>
+          </a:xfrm>
+          <a:prstGeom prst="line">
+            <a:avLst/>
+          </a:prstGeom>
+          <a:ln w="76200"/>
+        </p:spPr>
+        <p:style>
+          <a:lnRef idx="1">
+            <a:schemeClr val="accent1"/>
+          </a:lnRef>
+          <a:fillRef idx="0">
+            <a:schemeClr val="accent1"/>
+          </a:fillRef>
+          <a:effectRef idx="0">
+            <a:schemeClr val="accent1"/>
+          </a:effectRef>
+          <a:fontRef idx="minor">
+            <a:schemeClr val="tx1"/>
+          </a:fontRef>
+        </p:style>
+      </p:cxnSp>
+      <p:cxnSp>
+        <p:nvCxnSpPr>
+          <p:cNvPr id="56" name="Straight Connector 55">
+            <a:extLst>
+              <a:ext uri="{FF2B5EF4-FFF2-40B4-BE49-F238E27FC236}">
+                <a16:creationId xmlns:a16="http://schemas.microsoft.com/office/drawing/2014/main" id="{8A7F86A3-55C8-4848-AF9A-5C1467D8F9C1}"/>
+              </a:ext>
+            </a:extLst>
+          </p:cNvPr>
+          <p:cNvCxnSpPr>
+            <a:cxnSpLocks/>
+          </p:cNvCxnSpPr>
+          <p:nvPr/>
+        </p:nvCxnSpPr>
+        <p:spPr>
+          <a:xfrm flipH="1">
+            <a:off x="8868323" y="1703689"/>
+            <a:ext cx="543639" cy="564760"/>
+          </a:xfrm>
+          <a:prstGeom prst="line">
+            <a:avLst/>
+          </a:prstGeom>
+          <a:ln w="76200"/>
+        </p:spPr>
+        <p:style>
+          <a:lnRef idx="1">
+            <a:schemeClr val="accent1"/>
+          </a:lnRef>
+          <a:fillRef idx="0">
+            <a:schemeClr val="accent1"/>
+          </a:fillRef>
+          <a:effectRef idx="0">
+            <a:schemeClr val="accent1"/>
+          </a:effectRef>
+          <a:fontRef idx="minor">
+            <a:schemeClr val="tx1"/>
+          </a:fontRef>
+        </p:style>
+      </p:cxnSp>
     </p:spTree>
     <p:extLst>
       <p:ext uri="{BB962C8B-B14F-4D97-AF65-F5344CB8AC3E}">

</xml_diff>